<commit_message>
completed the intro and eda slides
</commit_message>
<xml_diff>
--- a/course6_Capstone/ml-capstone-template-coursera.pptx
+++ b/course6_Capstone/ml-capstone-template-coursera.pptx
@@ -900,6 +900,375 @@
 </file>
 
 <file path=ppt/notesSlides/notesSlide3.xml><?xml version="1.0" encoding="utf-8"?>
+<p:notes xmlns:a="http://schemas.openxmlformats.org/drawingml/2006/main" xmlns:r="http://schemas.openxmlformats.org/officeDocument/2006/relationships" xmlns:p="http://schemas.openxmlformats.org/presentationml/2006/main">
+  <p:cSld>
+    <p:spTree>
+      <p:nvGrpSpPr>
+        <p:cNvPr id="1" name=""/>
+        <p:cNvGrpSpPr/>
+        <p:nvPr/>
+      </p:nvGrpSpPr>
+      <p:grpSpPr>
+        <a:xfrm>
+          <a:off x="0" y="0"/>
+          <a:ext cx="0" cy="0"/>
+          <a:chOff x="0" y="0"/>
+          <a:chExt cx="0" cy="0"/>
+        </a:xfrm>
+      </p:grpSpPr>
+      <p:sp>
+        <p:nvSpPr>
+          <p:cNvPr id="2" name="Slide Image Placeholder 1"/>
+          <p:cNvSpPr>
+            <a:spLocks noGrp="1" noRot="1" noChangeAspect="1"/>
+          </p:cNvSpPr>
+          <p:nvPr>
+            <p:ph type="sldImg"/>
+          </p:nvPr>
+        </p:nvSpPr>
+        <p:spPr/>
+      </p:sp>
+      <p:sp>
+        <p:nvSpPr>
+          <p:cNvPr id="3" name="Notes Placeholder 2"/>
+          <p:cNvSpPr>
+            <a:spLocks noGrp="1"/>
+          </p:cNvSpPr>
+          <p:nvPr>
+            <p:ph type="body" idx="1"/>
+          </p:nvPr>
+        </p:nvSpPr>
+        <p:spPr/>
+        <p:txBody>
+          <a:bodyPr/>
+          <a:lstStyle/>
+          <a:p>
+            <a:r>
+              <a:rPr lang="en-US" dirty="0"/>
+              <a:t>A sorted bar chart of the total course offerings based on genre. The genres with the most courses (55-80) are related to Backend Development, Machine Learning. Database and Data Analysis.  The genres with the least amount of courses (under 10) are Chatbot and Blockchain. Note: Some course fit into multiple genres.</a:t>
+            </a:r>
+          </a:p>
+        </p:txBody>
+      </p:sp>
+      <p:sp>
+        <p:nvSpPr>
+          <p:cNvPr id="4" name="Slide Number Placeholder 3"/>
+          <p:cNvSpPr>
+            <a:spLocks noGrp="1"/>
+          </p:cNvSpPr>
+          <p:nvPr>
+            <p:ph type="sldNum" sz="quarter" idx="5"/>
+          </p:nvPr>
+        </p:nvSpPr>
+        <p:spPr/>
+        <p:txBody>
+          <a:bodyPr/>
+          <a:lstStyle/>
+          <a:p>
+            <a:fld id="{EEBDA0E2-FEBD-4B65-8F16-724CF984F377}" type="slidenum">
+              <a:rPr lang="en-US" smtClean="0"/>
+              <a:t>6</a:t>
+            </a:fld>
+            <a:endParaRPr lang="en-US"/>
+          </a:p>
+        </p:txBody>
+      </p:sp>
+    </p:spTree>
+    <p:extLst>
+      <p:ext uri="{BB962C8B-B14F-4D97-AF65-F5344CB8AC3E}">
+        <p14:creationId xmlns:p14="http://schemas.microsoft.com/office/powerpoint/2010/main" val="1744231591"/>
+      </p:ext>
+    </p:extLst>
+  </p:cSld>
+  <p:clrMapOvr>
+    <a:masterClrMapping/>
+  </p:clrMapOvr>
+</p:notes>
+</file>
+
+<file path=ppt/notesSlides/notesSlide4.xml><?xml version="1.0" encoding="utf-8"?>
+<p:notes xmlns:a="http://schemas.openxmlformats.org/drawingml/2006/main" xmlns:r="http://schemas.openxmlformats.org/officeDocument/2006/relationships" xmlns:p="http://schemas.openxmlformats.org/presentationml/2006/main">
+  <p:cSld>
+    <p:spTree>
+      <p:nvGrpSpPr>
+        <p:cNvPr id="1" name=""/>
+        <p:cNvGrpSpPr/>
+        <p:nvPr/>
+      </p:nvGrpSpPr>
+      <p:grpSpPr>
+        <a:xfrm>
+          <a:off x="0" y="0"/>
+          <a:ext cx="0" cy="0"/>
+          <a:chOff x="0" y="0"/>
+          <a:chExt cx="0" cy="0"/>
+        </a:xfrm>
+      </p:grpSpPr>
+      <p:sp>
+        <p:nvSpPr>
+          <p:cNvPr id="2" name="Slide Image Placeholder 1"/>
+          <p:cNvSpPr>
+            <a:spLocks noGrp="1" noRot="1" noChangeAspect="1"/>
+          </p:cNvSpPr>
+          <p:nvPr>
+            <p:ph type="sldImg"/>
+          </p:nvPr>
+        </p:nvSpPr>
+        <p:spPr/>
+      </p:sp>
+      <p:sp>
+        <p:nvSpPr>
+          <p:cNvPr id="3" name="Notes Placeholder 2"/>
+          <p:cNvSpPr>
+            <a:spLocks noGrp="1"/>
+          </p:cNvSpPr>
+          <p:nvPr>
+            <p:ph type="body" idx="1"/>
+          </p:nvPr>
+        </p:nvSpPr>
+        <p:spPr/>
+        <p:txBody>
+          <a:bodyPr/>
+          <a:lstStyle/>
+          <a:p>
+            <a:r>
+              <a:rPr lang="en-US" dirty="0"/>
+              <a:t>From the histogram, where each bar at a tick number ,x, represents the number of users enrolled in a total of x courses. Shows that by far, over eight thousand users enrolled in only one course. In fact, the majority of users enrolled in  under 10 courses. Interesting to note is that the second highest number of courses enrolled in is five and the number of courses after that have only a decreasing number of users.</a:t>
+            </a:r>
+          </a:p>
+        </p:txBody>
+      </p:sp>
+      <p:sp>
+        <p:nvSpPr>
+          <p:cNvPr id="4" name="Slide Number Placeholder 3"/>
+          <p:cNvSpPr>
+            <a:spLocks noGrp="1"/>
+          </p:cNvSpPr>
+          <p:nvPr>
+            <p:ph type="sldNum" sz="quarter" idx="5"/>
+          </p:nvPr>
+        </p:nvSpPr>
+        <p:spPr/>
+        <p:txBody>
+          <a:bodyPr/>
+          <a:lstStyle/>
+          <a:p>
+            <a:fld id="{EEBDA0E2-FEBD-4B65-8F16-724CF984F377}" type="slidenum">
+              <a:rPr lang="en-US" smtClean="0"/>
+              <a:t>7</a:t>
+            </a:fld>
+            <a:endParaRPr lang="en-US"/>
+          </a:p>
+        </p:txBody>
+      </p:sp>
+    </p:spTree>
+    <p:extLst>
+      <p:ext uri="{BB962C8B-B14F-4D97-AF65-F5344CB8AC3E}">
+        <p14:creationId xmlns:p14="http://schemas.microsoft.com/office/powerpoint/2010/main" val="2883702320"/>
+      </p:ext>
+    </p:extLst>
+  </p:cSld>
+  <p:clrMapOvr>
+    <a:masterClrMapping/>
+  </p:clrMapOvr>
+</p:notes>
+</file>
+
+<file path=ppt/notesSlides/notesSlide5.xml><?xml version="1.0" encoding="utf-8"?>
+<p:notes xmlns:a="http://schemas.openxmlformats.org/drawingml/2006/main" xmlns:r="http://schemas.openxmlformats.org/officeDocument/2006/relationships" xmlns:p="http://schemas.openxmlformats.org/presentationml/2006/main">
+  <p:cSld>
+    <p:spTree>
+      <p:nvGrpSpPr>
+        <p:cNvPr id="1" name=""/>
+        <p:cNvGrpSpPr/>
+        <p:nvPr/>
+      </p:nvGrpSpPr>
+      <p:grpSpPr>
+        <a:xfrm>
+          <a:off x="0" y="0"/>
+          <a:ext cx="0" cy="0"/>
+          <a:chOff x="0" y="0"/>
+          <a:chExt cx="0" cy="0"/>
+        </a:xfrm>
+      </p:grpSpPr>
+      <p:sp>
+        <p:nvSpPr>
+          <p:cNvPr id="2" name="Slide Image Placeholder 1"/>
+          <p:cNvSpPr>
+            <a:spLocks noGrp="1" noRot="1" noChangeAspect="1"/>
+          </p:cNvSpPr>
+          <p:nvPr>
+            <p:ph type="sldImg"/>
+          </p:nvPr>
+        </p:nvSpPr>
+        <p:spPr/>
+      </p:sp>
+      <p:sp>
+        <p:nvSpPr>
+          <p:cNvPr id="3" name="Notes Placeholder 2"/>
+          <p:cNvSpPr>
+            <a:spLocks noGrp="1"/>
+          </p:cNvSpPr>
+          <p:nvPr>
+            <p:ph type="body" idx="1"/>
+          </p:nvPr>
+        </p:nvSpPr>
+        <p:spPr/>
+        <p:txBody>
+          <a:bodyPr/>
+          <a:lstStyle/>
+          <a:p>
+            <a:r>
+              <a:rPr lang="en-US" dirty="0"/>
+              <a:t>The 20 most popular courses and their respective number of enrolled students is above. As you can see most popular course is Python for Data Science with almost 15,000 enrolled students. The next most popular course is Introduction to Data Science, which indicates that Data Science courses are in high demand. Interestingly enough, the top 20 most popular courses range from 3600 to 14,000 enrollments which indicates a heavily right skewed distribution.</a:t>
+            </a:r>
+          </a:p>
+        </p:txBody>
+      </p:sp>
+      <p:sp>
+        <p:nvSpPr>
+          <p:cNvPr id="4" name="Slide Number Placeholder 3"/>
+          <p:cNvSpPr>
+            <a:spLocks noGrp="1"/>
+          </p:cNvSpPr>
+          <p:nvPr>
+            <p:ph type="sldNum" sz="quarter" idx="5"/>
+          </p:nvPr>
+        </p:nvSpPr>
+        <p:spPr/>
+        <p:txBody>
+          <a:bodyPr/>
+          <a:lstStyle/>
+          <a:p>
+            <a:fld id="{EEBDA0E2-FEBD-4B65-8F16-724CF984F377}" type="slidenum">
+              <a:rPr lang="en-US" smtClean="0"/>
+              <a:t>8</a:t>
+            </a:fld>
+            <a:endParaRPr lang="en-US"/>
+          </a:p>
+        </p:txBody>
+      </p:sp>
+    </p:spTree>
+    <p:extLst>
+      <p:ext uri="{BB962C8B-B14F-4D97-AF65-F5344CB8AC3E}">
+        <p14:creationId xmlns:p14="http://schemas.microsoft.com/office/powerpoint/2010/main" val="2449892022"/>
+      </p:ext>
+    </p:extLst>
+  </p:cSld>
+  <p:clrMapOvr>
+    <a:masterClrMapping/>
+  </p:clrMapOvr>
+</p:notes>
+</file>
+
+<file path=ppt/notesSlides/notesSlide6.xml><?xml version="1.0" encoding="utf-8"?>
+<p:notes xmlns:a="http://schemas.openxmlformats.org/drawingml/2006/main" xmlns:r="http://schemas.openxmlformats.org/officeDocument/2006/relationships" xmlns:p="http://schemas.openxmlformats.org/presentationml/2006/main">
+  <p:cSld>
+    <p:spTree>
+      <p:nvGrpSpPr>
+        <p:cNvPr id="1" name=""/>
+        <p:cNvGrpSpPr/>
+        <p:nvPr/>
+      </p:nvGrpSpPr>
+      <p:grpSpPr>
+        <a:xfrm>
+          <a:off x="0" y="0"/>
+          <a:ext cx="0" cy="0"/>
+          <a:chOff x="0" y="0"/>
+          <a:chExt cx="0" cy="0"/>
+        </a:xfrm>
+      </p:grpSpPr>
+      <p:sp>
+        <p:nvSpPr>
+          <p:cNvPr id="2" name="Slide Image Placeholder 1"/>
+          <p:cNvSpPr>
+            <a:spLocks noGrp="1" noRot="1" noChangeAspect="1"/>
+          </p:cNvSpPr>
+          <p:nvPr>
+            <p:ph type="sldImg"/>
+          </p:nvPr>
+        </p:nvSpPr>
+        <p:spPr/>
+      </p:sp>
+      <p:sp>
+        <p:nvSpPr>
+          <p:cNvPr id="3" name="Notes Placeholder 2"/>
+          <p:cNvSpPr>
+            <a:spLocks noGrp="1"/>
+          </p:cNvSpPr>
+          <p:nvPr>
+            <p:ph type="body" idx="1"/>
+          </p:nvPr>
+        </p:nvSpPr>
+        <p:spPr/>
+        <p:txBody>
+          <a:bodyPr/>
+          <a:lstStyle/>
+          <a:p>
+            <a:r>
+              <a:rPr lang="en-US" dirty="0"/>
+              <a:t>The Word cloud was generated form the words from the course titles in the </a:t>
+            </a:r>
+            <a:r>
+              <a:rPr lang="en-US" dirty="0" err="1"/>
+              <a:t>course_df</a:t>
+            </a:r>
+            <a:r>
+              <a:rPr lang="en-US" dirty="0"/>
+              <a:t> </a:t>
+            </a:r>
+            <a:r>
+              <a:rPr lang="en-US" dirty="0" err="1"/>
+              <a:t>dataframe</a:t>
+            </a:r>
+            <a:r>
+              <a:rPr lang="en-US" dirty="0"/>
+              <a:t> from the course_genre.csv file. As we can see from the largest font-size words of “python”, “data science”, “data”, and “machine learning”, many of the course titles involved those words</a:t>
+            </a:r>
+            <a:r>
+              <a:rPr lang="en-US"/>
+              <a:t>/phrases.</a:t>
+            </a:r>
+            <a:endParaRPr lang="en-US" dirty="0"/>
+          </a:p>
+        </p:txBody>
+      </p:sp>
+      <p:sp>
+        <p:nvSpPr>
+          <p:cNvPr id="4" name="Slide Number Placeholder 3"/>
+          <p:cNvSpPr>
+            <a:spLocks noGrp="1"/>
+          </p:cNvSpPr>
+          <p:nvPr>
+            <p:ph type="sldNum" sz="quarter" idx="5"/>
+          </p:nvPr>
+        </p:nvSpPr>
+        <p:spPr/>
+        <p:txBody>
+          <a:bodyPr/>
+          <a:lstStyle/>
+          <a:p>
+            <a:fld id="{EEBDA0E2-FEBD-4B65-8F16-724CF984F377}" type="slidenum">
+              <a:rPr lang="en-US" smtClean="0"/>
+              <a:t>9</a:t>
+            </a:fld>
+            <a:endParaRPr lang="en-US"/>
+          </a:p>
+        </p:txBody>
+      </p:sp>
+    </p:spTree>
+    <p:extLst>
+      <p:ext uri="{BB962C8B-B14F-4D97-AF65-F5344CB8AC3E}">
+        <p14:creationId xmlns:p14="http://schemas.microsoft.com/office/powerpoint/2010/main" val="888995566"/>
+      </p:ext>
+    </p:extLst>
+  </p:cSld>
+  <p:clrMapOvr>
+    <a:masterClrMapping/>
+  </p:clrMapOvr>
+</p:notes>
+</file>
+
+<file path=ppt/notesSlides/notesSlide7.xml><?xml version="1.0" encoding="utf-8"?>
 <p:notes xmlns:a="http://schemas.openxmlformats.org/drawingml/2006/main" xmlns:r="http://schemas.openxmlformats.org/officeDocument/2006/relationships" xmlns:p="http://schemas.openxmlformats.org/presentationml/2006/main">
   <p:cSld>
     <p:spTree>
@@ -12431,7 +12800,7 @@
         <p:spPr>
           <a:xfrm>
             <a:off x="1251284" y="4166431"/>
-            <a:ext cx="2514600" cy="830997"/>
+            <a:ext cx="3054386" cy="830997"/>
           </a:xfrm>
           <a:prstGeom prst="rect">
             <a:avLst/>
@@ -12450,7 +12819,7 @@
                 <a:ea typeface="SF Pro" pitchFamily="2" charset="0"/>
                 <a:cs typeface="SF Pro" pitchFamily="2" charset="0"/>
               </a:rPr>
-              <a:t>&lt;Your Name&gt;</a:t>
+              <a:t>Kymberly Ayodeji</a:t>
             </a:r>
           </a:p>
           <a:p>
@@ -12460,7 +12829,7 @@
                 <a:ea typeface="SF Pro" pitchFamily="2" charset="0"/>
                 <a:cs typeface="SF Pro" pitchFamily="2" charset="0"/>
               </a:rPr>
-              <a:t>&lt;Date&gt;</a:t>
+              <a:t>December 31, 2023</a:t>
             </a:r>
           </a:p>
         </p:txBody>
@@ -12591,57 +12960,6 @@
           </a:prstGeom>
         </p:spPr>
       </p:pic>
-      <p:sp>
-        <p:nvSpPr>
-          <p:cNvPr id="14" name="TextBox 13">
-            <a:extLst>
-              <a:ext uri="{FF2B5EF4-FFF2-40B4-BE49-F238E27FC236}">
-                <a16:creationId xmlns:a16="http://schemas.microsoft.com/office/drawing/2014/main" id="{4B27D885-9EA7-4459-A4F4-F6A4BCBA0788}"/>
-              </a:ext>
-            </a:extLst>
-          </p:cNvPr>
-          <p:cNvSpPr txBox="1"/>
-          <p:nvPr/>
-        </p:nvSpPr>
-        <p:spPr>
-          <a:xfrm>
-            <a:off x="6851906" y="459384"/>
-            <a:ext cx="4889369" cy="1600438"/>
-          </a:xfrm>
-          <a:prstGeom prst="rect">
-            <a:avLst/>
-          </a:prstGeom>
-          <a:solidFill>
-            <a:schemeClr val="bg1">
-              <a:lumMod val="85000"/>
-            </a:schemeClr>
-          </a:solidFill>
-        </p:spPr>
-        <p:txBody>
-          <a:bodyPr wrap="square" rtlCol="0">
-            <a:spAutoFit/>
-          </a:bodyPr>
-          <a:lstStyle/>
-          <a:p>
-            <a:r>
-              <a:rPr lang="en-US" sz="2000" dirty="0"/>
-              <a:t>Instructions for learner: </a:t>
-            </a:r>
-          </a:p>
-          <a:p>
-            <a:endParaRPr lang="en-US" sz="2000" dirty="0"/>
-          </a:p>
-          <a:p>
-            <a:r>
-              <a:rPr lang="en-US" sz="2000" dirty="0"/>
-              <a:t>- Delete the brackets and type your name and date on the title slide </a:t>
-            </a:r>
-          </a:p>
-          <a:p>
-            <a:endParaRPr lang="en-US" dirty="0"/>
-          </a:p>
-        </p:txBody>
-      </p:sp>
     </p:spTree>
     <p:extLst>
       <p:ext uri="{BB962C8B-B14F-4D97-AF65-F5344CB8AC3E}">
@@ -15801,8 +16119,8 @@
         </p:nvSpPr>
         <p:spPr>
           <a:xfrm>
-            <a:off x="958697" y="2521403"/>
-            <a:ext cx="5660840" cy="1898424"/>
+            <a:off x="958696" y="2521403"/>
+            <a:ext cx="10111757" cy="3408880"/>
           </a:xfrm>
           <a:prstGeom prst="rect">
             <a:avLst/>
@@ -15991,7 +16309,7 @@
                 </a:solidFill>
                 <a:latin typeface="Abadi" panose="020B0604020104020204" pitchFamily="34" charset="0"/>
               </a:rPr>
-              <a:t>Project background and context</a:t>
+              <a:t>As people new to machine learning have a strong desire to upskill to the necessary information to further their interest and possible career through Massive Open Online Courses (MOOC), they would benefit from a resource that recommends appropriate courses based on their previous learning history.</a:t>
             </a:r>
           </a:p>
           <a:p>
@@ -16009,65 +16327,8 @@
                 </a:solidFill>
                 <a:latin typeface="Abadi" panose="020B0604020104020204" pitchFamily="34" charset="0"/>
               </a:rPr>
-              <a:t>Problem states and hypotheses</a:t>
-            </a:r>
-          </a:p>
-        </p:txBody>
-      </p:sp>
-      <p:sp>
-        <p:nvSpPr>
-          <p:cNvPr id="3" name="TextBox 2">
-            <a:extLst>
-              <a:ext uri="{FF2B5EF4-FFF2-40B4-BE49-F238E27FC236}">
-                <a16:creationId xmlns:a16="http://schemas.microsoft.com/office/drawing/2014/main" id="{1017016B-1D8F-4375-8D66-B508C6C4DC37}"/>
-              </a:ext>
-            </a:extLst>
-          </p:cNvPr>
-          <p:cNvSpPr txBox="1"/>
-          <p:nvPr/>
-        </p:nvSpPr>
-        <p:spPr>
-          <a:xfrm>
-            <a:off x="6468813" y="2521403"/>
-            <a:ext cx="5438707" cy="1908215"/>
-          </a:xfrm>
-          <a:prstGeom prst="rect">
-            <a:avLst/>
-          </a:prstGeom>
-          <a:solidFill>
-            <a:schemeClr val="bg1">
-              <a:lumMod val="85000"/>
-            </a:schemeClr>
-          </a:solidFill>
-        </p:spPr>
-        <p:txBody>
-          <a:bodyPr wrap="square" rtlCol="0">
-            <a:spAutoFit/>
-          </a:bodyPr>
-          <a:lstStyle/>
-          <a:p>
-            <a:r>
-              <a:rPr lang="en-US" sz="2000" dirty="0"/>
-              <a:t>Instructions for learner: </a:t>
-            </a:r>
-          </a:p>
-          <a:p>
-            <a:endParaRPr lang="en-US" sz="2000" dirty="0"/>
-          </a:p>
-          <a:p>
-            <a:r>
-              <a:rPr lang="en-US" sz="2000" dirty="0"/>
-              <a:t>- Describe the project background and context</a:t>
-            </a:r>
-          </a:p>
-          <a:p>
-            <a:r>
-              <a:rPr lang="en-US" sz="2000" dirty="0"/>
-              <a:t>- Describe the problem states and write the hypotheses</a:t>
-            </a:r>
-          </a:p>
-          <a:p>
-            <a:endParaRPr lang="en-US" dirty="0"/>
+              <a:t>Our goal is to improve the learning experience by helping students quickly find new courses better aligned to their learning history via a course recommender application.</a:t>
+            </a:r>
           </a:p>
         </p:txBody>
       </p:sp>
@@ -16238,10 +16499,10 @@
       </p:sp>
       <p:pic>
         <p:nvPicPr>
-          <p:cNvPr id="3" name="Picture 2" descr="Chart, bar chart&#10;&#10;Description automatically generated">
-            <a:extLst>
-              <a:ext uri="{FF2B5EF4-FFF2-40B4-BE49-F238E27FC236}">
-                <a16:creationId xmlns:a16="http://schemas.microsoft.com/office/drawing/2014/main" id="{7AA3222A-1B0C-7C44-8963-3D25216C4799}"/>
+          <p:cNvPr id="5" name="Picture 4">
+            <a:extLst>
+              <a:ext uri="{FF2B5EF4-FFF2-40B4-BE49-F238E27FC236}">
+                <a16:creationId xmlns:a16="http://schemas.microsoft.com/office/drawing/2014/main" id="{1D013AEF-003A-4285-26D9-5069B75B012E}"/>
               </a:ext>
             </a:extLst>
           </p:cNvPr>
@@ -16251,289 +16512,21 @@
           <p:nvPr/>
         </p:nvPicPr>
         <p:blipFill>
-          <a:blip r:embed="rId2"/>
+          <a:blip r:embed="rId3"/>
           <a:stretch>
             <a:fillRect/>
           </a:stretch>
         </p:blipFill>
         <p:spPr>
           <a:xfrm>
-            <a:off x="4297212" y="2966920"/>
-            <a:ext cx="3388326" cy="2837115"/>
+            <a:off x="2828925" y="928636"/>
+            <a:ext cx="5897825" cy="5605513"/>
           </a:xfrm>
           <a:prstGeom prst="rect">
             <a:avLst/>
           </a:prstGeom>
         </p:spPr>
       </p:pic>
-      <p:sp>
-        <p:nvSpPr>
-          <p:cNvPr id="8" name="Content Placeholder 4">
-            <a:extLst>
-              <a:ext uri="{FF2B5EF4-FFF2-40B4-BE49-F238E27FC236}">
-                <a16:creationId xmlns:a16="http://schemas.microsoft.com/office/drawing/2014/main" id="{8653FA46-2212-42E4-9D89-321A9B15A6C2}"/>
-              </a:ext>
-            </a:extLst>
-          </p:cNvPr>
-          <p:cNvSpPr txBox="1">
-            <a:spLocks/>
-          </p:cNvSpPr>
-          <p:nvPr/>
-        </p:nvSpPr>
-        <p:spPr>
-          <a:xfrm>
-            <a:off x="855663" y="1792289"/>
-            <a:ext cx="10515600" cy="4011746"/>
-          </a:xfrm>
-          <a:prstGeom prst="rect">
-            <a:avLst/>
-          </a:prstGeom>
-          <a:ln>
-            <a:solidFill>
-              <a:srgbClr val="0B49CB"/>
-            </a:solidFill>
-            <a:prstDash val="dash"/>
-          </a:ln>
-        </p:spPr>
-        <p:txBody>
-          <a:bodyPr vert="horz" lIns="91440" tIns="45720" rIns="91440" bIns="45720" rtlCol="0" anchor="t">
-            <a:normAutofit/>
-          </a:bodyPr>
-          <a:lstStyle>
-            <a:lvl1pPr marL="228600" indent="-228600" algn="l" defTabSz="914400" rtl="0" eaLnBrk="1" latinLnBrk="0" hangingPunct="1">
-              <a:lnSpc>
-                <a:spcPct val="90000"/>
-              </a:lnSpc>
-              <a:spcBef>
-                <a:spcPts val="1000"/>
-              </a:spcBef>
-              <a:buFont typeface="Arial" panose="020B0604020202020204" pitchFamily="34" charset="0"/>
-              <a:buChar char="•"/>
-              <a:defRPr sz="2800" kern="1200">
-                <a:solidFill>
-                  <a:schemeClr val="tx1"/>
-                </a:solidFill>
-                <a:latin typeface="+mn-lt"/>
-                <a:ea typeface="+mn-ea"/>
-                <a:cs typeface="+mn-cs"/>
-              </a:defRPr>
-            </a:lvl1pPr>
-            <a:lvl2pPr marL="685800" indent="-228600" algn="l" defTabSz="914400" rtl="0" eaLnBrk="1" latinLnBrk="0" hangingPunct="1">
-              <a:lnSpc>
-                <a:spcPct val="90000"/>
-              </a:lnSpc>
-              <a:spcBef>
-                <a:spcPts val="500"/>
-              </a:spcBef>
-              <a:buFont typeface="Arial" panose="020B0604020202020204" pitchFamily="34" charset="0"/>
-              <a:buChar char="•"/>
-              <a:defRPr sz="2400" kern="1200">
-                <a:solidFill>
-                  <a:schemeClr val="tx1"/>
-                </a:solidFill>
-                <a:latin typeface="+mn-lt"/>
-                <a:ea typeface="+mn-ea"/>
-                <a:cs typeface="+mn-cs"/>
-              </a:defRPr>
-            </a:lvl2pPr>
-            <a:lvl3pPr marL="1143000" indent="-228600" algn="l" defTabSz="914400" rtl="0" eaLnBrk="1" latinLnBrk="0" hangingPunct="1">
-              <a:lnSpc>
-                <a:spcPct val="90000"/>
-              </a:lnSpc>
-              <a:spcBef>
-                <a:spcPts val="500"/>
-              </a:spcBef>
-              <a:buFont typeface="Arial" panose="020B0604020202020204" pitchFamily="34" charset="0"/>
-              <a:buChar char="•"/>
-              <a:defRPr sz="2000" kern="1200">
-                <a:solidFill>
-                  <a:schemeClr val="tx1"/>
-                </a:solidFill>
-                <a:latin typeface="+mn-lt"/>
-                <a:ea typeface="+mn-ea"/>
-                <a:cs typeface="+mn-cs"/>
-              </a:defRPr>
-            </a:lvl3pPr>
-            <a:lvl4pPr marL="1600200" indent="-228600" algn="l" defTabSz="914400" rtl="0" eaLnBrk="1" latinLnBrk="0" hangingPunct="1">
-              <a:lnSpc>
-                <a:spcPct val="90000"/>
-              </a:lnSpc>
-              <a:spcBef>
-                <a:spcPts val="500"/>
-              </a:spcBef>
-              <a:buFont typeface="Arial" panose="020B0604020202020204" pitchFamily="34" charset="0"/>
-              <a:buChar char="•"/>
-              <a:defRPr sz="1800" kern="1200">
-                <a:solidFill>
-                  <a:schemeClr val="tx1"/>
-                </a:solidFill>
-                <a:latin typeface="+mn-lt"/>
-                <a:ea typeface="+mn-ea"/>
-                <a:cs typeface="+mn-cs"/>
-              </a:defRPr>
-            </a:lvl4pPr>
-            <a:lvl5pPr marL="2057400" indent="-228600" algn="l" defTabSz="914400" rtl="0" eaLnBrk="1" latinLnBrk="0" hangingPunct="1">
-              <a:lnSpc>
-                <a:spcPct val="90000"/>
-              </a:lnSpc>
-              <a:spcBef>
-                <a:spcPts val="500"/>
-              </a:spcBef>
-              <a:buFont typeface="Arial" panose="020B0604020202020204" pitchFamily="34" charset="0"/>
-              <a:buChar char="•"/>
-              <a:defRPr sz="1800" kern="1200">
-                <a:solidFill>
-                  <a:schemeClr val="tx1"/>
-                </a:solidFill>
-                <a:latin typeface="+mn-lt"/>
-                <a:ea typeface="+mn-ea"/>
-                <a:cs typeface="+mn-cs"/>
-              </a:defRPr>
-            </a:lvl5pPr>
-            <a:lvl6pPr marL="2514600" indent="-228600" algn="l" defTabSz="914400" rtl="0" eaLnBrk="1" latinLnBrk="0" hangingPunct="1">
-              <a:lnSpc>
-                <a:spcPct val="90000"/>
-              </a:lnSpc>
-              <a:spcBef>
-                <a:spcPts val="500"/>
-              </a:spcBef>
-              <a:buFont typeface="Arial" panose="020B0604020202020204" pitchFamily="34" charset="0"/>
-              <a:buChar char="•"/>
-              <a:defRPr sz="1800" kern="1200">
-                <a:solidFill>
-                  <a:schemeClr val="tx1"/>
-                </a:solidFill>
-                <a:latin typeface="+mn-lt"/>
-                <a:ea typeface="+mn-ea"/>
-                <a:cs typeface="+mn-cs"/>
-              </a:defRPr>
-            </a:lvl6pPr>
-            <a:lvl7pPr marL="2971800" indent="-228600" algn="l" defTabSz="914400" rtl="0" eaLnBrk="1" latinLnBrk="0" hangingPunct="1">
-              <a:lnSpc>
-                <a:spcPct val="90000"/>
-              </a:lnSpc>
-              <a:spcBef>
-                <a:spcPts val="500"/>
-              </a:spcBef>
-              <a:buFont typeface="Arial" panose="020B0604020202020204" pitchFamily="34" charset="0"/>
-              <a:buChar char="•"/>
-              <a:defRPr sz="1800" kern="1200">
-                <a:solidFill>
-                  <a:schemeClr val="tx1"/>
-                </a:solidFill>
-                <a:latin typeface="+mn-lt"/>
-                <a:ea typeface="+mn-ea"/>
-                <a:cs typeface="+mn-cs"/>
-              </a:defRPr>
-            </a:lvl7pPr>
-            <a:lvl8pPr marL="3429000" indent="-228600" algn="l" defTabSz="914400" rtl="0" eaLnBrk="1" latinLnBrk="0" hangingPunct="1">
-              <a:lnSpc>
-                <a:spcPct val="90000"/>
-              </a:lnSpc>
-              <a:spcBef>
-                <a:spcPts val="500"/>
-              </a:spcBef>
-              <a:buFont typeface="Arial" panose="020B0604020202020204" pitchFamily="34" charset="0"/>
-              <a:buChar char="•"/>
-              <a:defRPr sz="1800" kern="1200">
-                <a:solidFill>
-                  <a:schemeClr val="tx1"/>
-                </a:solidFill>
-                <a:latin typeface="+mn-lt"/>
-                <a:ea typeface="+mn-ea"/>
-                <a:cs typeface="+mn-cs"/>
-              </a:defRPr>
-            </a:lvl8pPr>
-            <a:lvl9pPr marL="3886200" indent="-228600" algn="l" defTabSz="914400" rtl="0" eaLnBrk="1" latinLnBrk="0" hangingPunct="1">
-              <a:lnSpc>
-                <a:spcPct val="90000"/>
-              </a:lnSpc>
-              <a:spcBef>
-                <a:spcPts val="500"/>
-              </a:spcBef>
-              <a:buFont typeface="Arial" panose="020B0604020202020204" pitchFamily="34" charset="0"/>
-              <a:buChar char="•"/>
-              <a:defRPr sz="1800" kern="1200">
-                <a:solidFill>
-                  <a:schemeClr val="tx1"/>
-                </a:solidFill>
-                <a:latin typeface="+mn-lt"/>
-                <a:ea typeface="+mn-ea"/>
-                <a:cs typeface="+mn-cs"/>
-              </a:defRPr>
-            </a:lvl9pPr>
-          </a:lstStyle>
-          <a:p>
-            <a:pPr>
-              <a:buFontTx/>
-              <a:buChar char="-"/>
-            </a:pPr>
-            <a:r>
-              <a:rPr lang="en-US" sz="2000" dirty="0">
-                <a:solidFill>
-                  <a:srgbClr val="1C7DDB"/>
-                </a:solidFill>
-                <a:latin typeface="Abadi"/>
-              </a:rPr>
-              <a:t>Place the barchart of course counts per genre here</a:t>
-            </a:r>
-          </a:p>
-          <a:p>
-            <a:pPr>
-              <a:buFontTx/>
-              <a:buChar char="-"/>
-            </a:pPr>
-            <a:r>
-              <a:rPr lang="en-US" sz="2000" dirty="0">
-                <a:solidFill>
-                  <a:srgbClr val="1C7DDB"/>
-                </a:solidFill>
-                <a:latin typeface="Abadi"/>
-              </a:rPr>
-              <a:t>Briefly explain the barchart in the slide notes (for peer-review purpose)</a:t>
-            </a:r>
-          </a:p>
-          <a:p>
-            <a:pPr>
-              <a:buFontTx/>
-              <a:buChar char="-"/>
-            </a:pPr>
-            <a:r>
-              <a:rPr lang="en-US" sz="2000" dirty="0">
-                <a:solidFill>
-                  <a:srgbClr val="1C7DDB"/>
-                </a:solidFill>
-                <a:latin typeface="Abadi"/>
-              </a:rPr>
-              <a:t>A sample bar chart may look like the following:</a:t>
-            </a:r>
-          </a:p>
-          <a:p>
-            <a:pPr>
-              <a:buFontTx/>
-              <a:buChar char="-"/>
-            </a:pPr>
-            <a:endParaRPr lang="en-US" sz="2200" dirty="0">
-              <a:solidFill>
-                <a:srgbClr val="1C7DDB"/>
-              </a:solidFill>
-              <a:latin typeface="Abadi"/>
-            </a:endParaRPr>
-          </a:p>
-          <a:p>
-            <a:pPr>
-              <a:buFontTx/>
-              <a:buChar char="-"/>
-            </a:pPr>
-            <a:endParaRPr lang="en-US" sz="2200" dirty="0">
-              <a:solidFill>
-                <a:srgbClr val="1C7DDB"/>
-              </a:solidFill>
-              <a:latin typeface="Abadi"/>
-            </a:endParaRPr>
-          </a:p>
-        </p:txBody>
-      </p:sp>
     </p:spTree>
     <p:extLst>
       <p:ext uri="{BB962C8B-B14F-4D97-AF65-F5344CB8AC3E}">
@@ -16597,268 +16590,6 @@
           </a:p>
         </p:txBody>
       </p:sp>
-      <p:sp>
-        <p:nvSpPr>
-          <p:cNvPr id="6" name="Content Placeholder 4">
-            <a:extLst>
-              <a:ext uri="{FF2B5EF4-FFF2-40B4-BE49-F238E27FC236}">
-                <a16:creationId xmlns:a16="http://schemas.microsoft.com/office/drawing/2014/main" id="{A4D1CBA0-D4EF-0E4C-91FB-ACF90D54854A}"/>
-              </a:ext>
-            </a:extLst>
-          </p:cNvPr>
-          <p:cNvSpPr txBox="1">
-            <a:spLocks/>
-          </p:cNvSpPr>
-          <p:nvPr/>
-        </p:nvSpPr>
-        <p:spPr>
-          <a:xfrm>
-            <a:off x="855663" y="1792289"/>
-            <a:ext cx="10515600" cy="4011746"/>
-          </a:xfrm>
-          <a:prstGeom prst="rect">
-            <a:avLst/>
-          </a:prstGeom>
-          <a:ln>
-            <a:solidFill>
-              <a:srgbClr val="0B49CB"/>
-            </a:solidFill>
-            <a:prstDash val="dash"/>
-          </a:ln>
-        </p:spPr>
-        <p:txBody>
-          <a:bodyPr vert="horz" lIns="91440" tIns="45720" rIns="91440" bIns="45720" rtlCol="0" anchor="t">
-            <a:normAutofit/>
-          </a:bodyPr>
-          <a:lstStyle>
-            <a:lvl1pPr marL="228600" indent="-228600" algn="l" defTabSz="914400" rtl="0" eaLnBrk="1" latinLnBrk="0" hangingPunct="1">
-              <a:lnSpc>
-                <a:spcPct val="90000"/>
-              </a:lnSpc>
-              <a:spcBef>
-                <a:spcPts val="1000"/>
-              </a:spcBef>
-              <a:buFont typeface="Arial" panose="020B0604020202020204" pitchFamily="34" charset="0"/>
-              <a:buChar char="•"/>
-              <a:defRPr sz="2800" kern="1200">
-                <a:solidFill>
-                  <a:schemeClr val="tx1"/>
-                </a:solidFill>
-                <a:latin typeface="+mn-lt"/>
-                <a:ea typeface="+mn-ea"/>
-                <a:cs typeface="+mn-cs"/>
-              </a:defRPr>
-            </a:lvl1pPr>
-            <a:lvl2pPr marL="685800" indent="-228600" algn="l" defTabSz="914400" rtl="0" eaLnBrk="1" latinLnBrk="0" hangingPunct="1">
-              <a:lnSpc>
-                <a:spcPct val="90000"/>
-              </a:lnSpc>
-              <a:spcBef>
-                <a:spcPts val="500"/>
-              </a:spcBef>
-              <a:buFont typeface="Arial" panose="020B0604020202020204" pitchFamily="34" charset="0"/>
-              <a:buChar char="•"/>
-              <a:defRPr sz="2400" kern="1200">
-                <a:solidFill>
-                  <a:schemeClr val="tx1"/>
-                </a:solidFill>
-                <a:latin typeface="+mn-lt"/>
-                <a:ea typeface="+mn-ea"/>
-                <a:cs typeface="+mn-cs"/>
-              </a:defRPr>
-            </a:lvl2pPr>
-            <a:lvl3pPr marL="1143000" indent="-228600" algn="l" defTabSz="914400" rtl="0" eaLnBrk="1" latinLnBrk="0" hangingPunct="1">
-              <a:lnSpc>
-                <a:spcPct val="90000"/>
-              </a:lnSpc>
-              <a:spcBef>
-                <a:spcPts val="500"/>
-              </a:spcBef>
-              <a:buFont typeface="Arial" panose="020B0604020202020204" pitchFamily="34" charset="0"/>
-              <a:buChar char="•"/>
-              <a:defRPr sz="2000" kern="1200">
-                <a:solidFill>
-                  <a:schemeClr val="tx1"/>
-                </a:solidFill>
-                <a:latin typeface="+mn-lt"/>
-                <a:ea typeface="+mn-ea"/>
-                <a:cs typeface="+mn-cs"/>
-              </a:defRPr>
-            </a:lvl3pPr>
-            <a:lvl4pPr marL="1600200" indent="-228600" algn="l" defTabSz="914400" rtl="0" eaLnBrk="1" latinLnBrk="0" hangingPunct="1">
-              <a:lnSpc>
-                <a:spcPct val="90000"/>
-              </a:lnSpc>
-              <a:spcBef>
-                <a:spcPts val="500"/>
-              </a:spcBef>
-              <a:buFont typeface="Arial" panose="020B0604020202020204" pitchFamily="34" charset="0"/>
-              <a:buChar char="•"/>
-              <a:defRPr sz="1800" kern="1200">
-                <a:solidFill>
-                  <a:schemeClr val="tx1"/>
-                </a:solidFill>
-                <a:latin typeface="+mn-lt"/>
-                <a:ea typeface="+mn-ea"/>
-                <a:cs typeface="+mn-cs"/>
-              </a:defRPr>
-            </a:lvl4pPr>
-            <a:lvl5pPr marL="2057400" indent="-228600" algn="l" defTabSz="914400" rtl="0" eaLnBrk="1" latinLnBrk="0" hangingPunct="1">
-              <a:lnSpc>
-                <a:spcPct val="90000"/>
-              </a:lnSpc>
-              <a:spcBef>
-                <a:spcPts val="500"/>
-              </a:spcBef>
-              <a:buFont typeface="Arial" panose="020B0604020202020204" pitchFamily="34" charset="0"/>
-              <a:buChar char="•"/>
-              <a:defRPr sz="1800" kern="1200">
-                <a:solidFill>
-                  <a:schemeClr val="tx1"/>
-                </a:solidFill>
-                <a:latin typeface="+mn-lt"/>
-                <a:ea typeface="+mn-ea"/>
-                <a:cs typeface="+mn-cs"/>
-              </a:defRPr>
-            </a:lvl5pPr>
-            <a:lvl6pPr marL="2514600" indent="-228600" algn="l" defTabSz="914400" rtl="0" eaLnBrk="1" latinLnBrk="0" hangingPunct="1">
-              <a:lnSpc>
-                <a:spcPct val="90000"/>
-              </a:lnSpc>
-              <a:spcBef>
-                <a:spcPts val="500"/>
-              </a:spcBef>
-              <a:buFont typeface="Arial" panose="020B0604020202020204" pitchFamily="34" charset="0"/>
-              <a:buChar char="•"/>
-              <a:defRPr sz="1800" kern="1200">
-                <a:solidFill>
-                  <a:schemeClr val="tx1"/>
-                </a:solidFill>
-                <a:latin typeface="+mn-lt"/>
-                <a:ea typeface="+mn-ea"/>
-                <a:cs typeface="+mn-cs"/>
-              </a:defRPr>
-            </a:lvl6pPr>
-            <a:lvl7pPr marL="2971800" indent="-228600" algn="l" defTabSz="914400" rtl="0" eaLnBrk="1" latinLnBrk="0" hangingPunct="1">
-              <a:lnSpc>
-                <a:spcPct val="90000"/>
-              </a:lnSpc>
-              <a:spcBef>
-                <a:spcPts val="500"/>
-              </a:spcBef>
-              <a:buFont typeface="Arial" panose="020B0604020202020204" pitchFamily="34" charset="0"/>
-              <a:buChar char="•"/>
-              <a:defRPr sz="1800" kern="1200">
-                <a:solidFill>
-                  <a:schemeClr val="tx1"/>
-                </a:solidFill>
-                <a:latin typeface="+mn-lt"/>
-                <a:ea typeface="+mn-ea"/>
-                <a:cs typeface="+mn-cs"/>
-              </a:defRPr>
-            </a:lvl7pPr>
-            <a:lvl8pPr marL="3429000" indent="-228600" algn="l" defTabSz="914400" rtl="0" eaLnBrk="1" latinLnBrk="0" hangingPunct="1">
-              <a:lnSpc>
-                <a:spcPct val="90000"/>
-              </a:lnSpc>
-              <a:spcBef>
-                <a:spcPts val="500"/>
-              </a:spcBef>
-              <a:buFont typeface="Arial" panose="020B0604020202020204" pitchFamily="34" charset="0"/>
-              <a:buChar char="•"/>
-              <a:defRPr sz="1800" kern="1200">
-                <a:solidFill>
-                  <a:schemeClr val="tx1"/>
-                </a:solidFill>
-                <a:latin typeface="+mn-lt"/>
-                <a:ea typeface="+mn-ea"/>
-                <a:cs typeface="+mn-cs"/>
-              </a:defRPr>
-            </a:lvl8pPr>
-            <a:lvl9pPr marL="3886200" indent="-228600" algn="l" defTabSz="914400" rtl="0" eaLnBrk="1" latinLnBrk="0" hangingPunct="1">
-              <a:lnSpc>
-                <a:spcPct val="90000"/>
-              </a:lnSpc>
-              <a:spcBef>
-                <a:spcPts val="500"/>
-              </a:spcBef>
-              <a:buFont typeface="Arial" panose="020B0604020202020204" pitchFamily="34" charset="0"/>
-              <a:buChar char="•"/>
-              <a:defRPr sz="1800" kern="1200">
-                <a:solidFill>
-                  <a:schemeClr val="tx1"/>
-                </a:solidFill>
-                <a:latin typeface="+mn-lt"/>
-                <a:ea typeface="+mn-ea"/>
-                <a:cs typeface="+mn-cs"/>
-              </a:defRPr>
-            </a:lvl9pPr>
-          </a:lstStyle>
-          <a:p>
-            <a:pPr marL="0" indent="0">
-              <a:buNone/>
-            </a:pPr>
-            <a:r>
-              <a:rPr lang="en-US" sz="2000" dirty="0">
-                <a:solidFill>
-                  <a:srgbClr val="1C7DDB"/>
-                </a:solidFill>
-                <a:latin typeface="Abadi"/>
-              </a:rPr>
-              <a:t>- Place the histogram showing the enrollment distributions here, e.g., it  clearly shows how many users enrolled in just 1 course or how many enrolled 10 courses, etc.</a:t>
-            </a:r>
-          </a:p>
-          <a:p>
-            <a:pPr marL="0" indent="0">
-              <a:buNone/>
-            </a:pPr>
-            <a:r>
-              <a:rPr lang="en-US" sz="2000" dirty="0">
-                <a:solidFill>
-                  <a:srgbClr val="1C7DDB"/>
-                </a:solidFill>
-                <a:latin typeface="Abadi"/>
-              </a:rPr>
-              <a:t>- Briefly explain the histogram in the slide notes (for peer-review purpose)</a:t>
-            </a:r>
-            <a:endParaRPr lang="en-US" sz="2000" dirty="0">
-              <a:solidFill>
-                <a:srgbClr val="1C7DDB"/>
-              </a:solidFill>
-              <a:latin typeface="Abadi"/>
-              <a:cs typeface="Calibri"/>
-            </a:endParaRPr>
-          </a:p>
-          <a:p>
-            <a:pPr marL="0" indent="0">
-              <a:buNone/>
-            </a:pPr>
-            <a:r>
-              <a:rPr lang="en-US" sz="2000" dirty="0">
-                <a:solidFill>
-                  <a:srgbClr val="1C7DDB"/>
-                </a:solidFill>
-                <a:latin typeface="Abadi"/>
-                <a:cs typeface="Calibri"/>
-              </a:rPr>
-              <a:t>- A sample histogram may look like the following:</a:t>
-            </a:r>
-          </a:p>
-          <a:p>
-            <a:pPr>
-              <a:buFontTx/>
-              <a:buChar char="-"/>
-            </a:pPr>
-            <a:endParaRPr lang="en-US" sz="2200" dirty="0">
-              <a:solidFill>
-                <a:srgbClr val="1C7DDB"/>
-              </a:solidFill>
-              <a:latin typeface="Abadi"/>
-              <a:cs typeface="Calibri"/>
-            </a:endParaRPr>
-          </a:p>
-        </p:txBody>
-      </p:sp>
       <p:pic>
         <p:nvPicPr>
           <p:cNvPr id="3" name="Picture 2" descr="Chart, histogram&#10;&#10;Description automatically generated">
@@ -16874,7 +16605,7 @@
           <p:nvPr/>
         </p:nvPicPr>
         <p:blipFill>
-          <a:blip r:embed="rId2"/>
+          <a:blip r:embed="rId3"/>
           <a:stretch>
             <a:fillRect/>
           </a:stretch>
@@ -16883,6 +16614,36 @@
           <a:xfrm>
             <a:off x="4052712" y="3357348"/>
             <a:ext cx="4086575" cy="2367758"/>
+          </a:xfrm>
+          <a:prstGeom prst="rect">
+            <a:avLst/>
+          </a:prstGeom>
+        </p:spPr>
+      </p:pic>
+      <p:pic>
+        <p:nvPicPr>
+          <p:cNvPr id="5" name="Picture 4">
+            <a:extLst>
+              <a:ext uri="{FF2B5EF4-FFF2-40B4-BE49-F238E27FC236}">
+                <a16:creationId xmlns:a16="http://schemas.microsoft.com/office/drawing/2014/main" id="{57562139-617F-4F05-20F6-5A23E736F5D8}"/>
+              </a:ext>
+            </a:extLst>
+          </p:cNvPr>
+          <p:cNvPicPr>
+            <a:picLocks noChangeAspect="1"/>
+          </p:cNvPicPr>
+          <p:nvPr/>
+        </p:nvPicPr>
+        <p:blipFill>
+          <a:blip r:embed="rId4"/>
+          <a:stretch>
+            <a:fillRect/>
+          </a:stretch>
+        </p:blipFill>
+        <p:spPr>
+          <a:xfrm>
+            <a:off x="2743200" y="823912"/>
+            <a:ext cx="6705600" cy="5210175"/>
           </a:xfrm>
           <a:prstGeom prst="rect">
             <a:avLst/>
@@ -16952,267 +16713,6 @@
           </a:p>
         </p:txBody>
       </p:sp>
-      <p:sp>
-        <p:nvSpPr>
-          <p:cNvPr id="6" name="Content Placeholder 4">
-            <a:extLst>
-              <a:ext uri="{FF2B5EF4-FFF2-40B4-BE49-F238E27FC236}">
-                <a16:creationId xmlns:a16="http://schemas.microsoft.com/office/drawing/2014/main" id="{A4D1CBA0-D4EF-0E4C-91FB-ACF90D54854A}"/>
-              </a:ext>
-            </a:extLst>
-          </p:cNvPr>
-          <p:cNvSpPr txBox="1">
-            <a:spLocks/>
-          </p:cNvSpPr>
-          <p:nvPr/>
-        </p:nvSpPr>
-        <p:spPr>
-          <a:xfrm>
-            <a:off x="855663" y="1792289"/>
-            <a:ext cx="10515600" cy="4618136"/>
-          </a:xfrm>
-          <a:prstGeom prst="rect">
-            <a:avLst/>
-          </a:prstGeom>
-          <a:ln>
-            <a:solidFill>
-              <a:srgbClr val="0B49CB"/>
-            </a:solidFill>
-            <a:prstDash val="dash"/>
-          </a:ln>
-        </p:spPr>
-        <p:txBody>
-          <a:bodyPr vert="horz" lIns="91440" tIns="45720" rIns="91440" bIns="45720" rtlCol="0" anchor="t">
-            <a:normAutofit/>
-          </a:bodyPr>
-          <a:lstStyle>
-            <a:lvl1pPr marL="228600" indent="-228600" algn="l" defTabSz="914400" rtl="0" eaLnBrk="1" latinLnBrk="0" hangingPunct="1">
-              <a:lnSpc>
-                <a:spcPct val="90000"/>
-              </a:lnSpc>
-              <a:spcBef>
-                <a:spcPts val="1000"/>
-              </a:spcBef>
-              <a:buFont typeface="Arial" panose="020B0604020202020204" pitchFamily="34" charset="0"/>
-              <a:buChar char="•"/>
-              <a:defRPr sz="2800" kern="1200">
-                <a:solidFill>
-                  <a:schemeClr val="tx1"/>
-                </a:solidFill>
-                <a:latin typeface="+mn-lt"/>
-                <a:ea typeface="+mn-ea"/>
-                <a:cs typeface="+mn-cs"/>
-              </a:defRPr>
-            </a:lvl1pPr>
-            <a:lvl2pPr marL="685800" indent="-228600" algn="l" defTabSz="914400" rtl="0" eaLnBrk="1" latinLnBrk="0" hangingPunct="1">
-              <a:lnSpc>
-                <a:spcPct val="90000"/>
-              </a:lnSpc>
-              <a:spcBef>
-                <a:spcPts val="500"/>
-              </a:spcBef>
-              <a:buFont typeface="Arial" panose="020B0604020202020204" pitchFamily="34" charset="0"/>
-              <a:buChar char="•"/>
-              <a:defRPr sz="2400" kern="1200">
-                <a:solidFill>
-                  <a:schemeClr val="tx1"/>
-                </a:solidFill>
-                <a:latin typeface="+mn-lt"/>
-                <a:ea typeface="+mn-ea"/>
-                <a:cs typeface="+mn-cs"/>
-              </a:defRPr>
-            </a:lvl2pPr>
-            <a:lvl3pPr marL="1143000" indent="-228600" algn="l" defTabSz="914400" rtl="0" eaLnBrk="1" latinLnBrk="0" hangingPunct="1">
-              <a:lnSpc>
-                <a:spcPct val="90000"/>
-              </a:lnSpc>
-              <a:spcBef>
-                <a:spcPts val="500"/>
-              </a:spcBef>
-              <a:buFont typeface="Arial" panose="020B0604020202020204" pitchFamily="34" charset="0"/>
-              <a:buChar char="•"/>
-              <a:defRPr sz="2000" kern="1200">
-                <a:solidFill>
-                  <a:schemeClr val="tx1"/>
-                </a:solidFill>
-                <a:latin typeface="+mn-lt"/>
-                <a:ea typeface="+mn-ea"/>
-                <a:cs typeface="+mn-cs"/>
-              </a:defRPr>
-            </a:lvl3pPr>
-            <a:lvl4pPr marL="1600200" indent="-228600" algn="l" defTabSz="914400" rtl="0" eaLnBrk="1" latinLnBrk="0" hangingPunct="1">
-              <a:lnSpc>
-                <a:spcPct val="90000"/>
-              </a:lnSpc>
-              <a:spcBef>
-                <a:spcPts val="500"/>
-              </a:spcBef>
-              <a:buFont typeface="Arial" panose="020B0604020202020204" pitchFamily="34" charset="0"/>
-              <a:buChar char="•"/>
-              <a:defRPr sz="1800" kern="1200">
-                <a:solidFill>
-                  <a:schemeClr val="tx1"/>
-                </a:solidFill>
-                <a:latin typeface="+mn-lt"/>
-                <a:ea typeface="+mn-ea"/>
-                <a:cs typeface="+mn-cs"/>
-              </a:defRPr>
-            </a:lvl4pPr>
-            <a:lvl5pPr marL="2057400" indent="-228600" algn="l" defTabSz="914400" rtl="0" eaLnBrk="1" latinLnBrk="0" hangingPunct="1">
-              <a:lnSpc>
-                <a:spcPct val="90000"/>
-              </a:lnSpc>
-              <a:spcBef>
-                <a:spcPts val="500"/>
-              </a:spcBef>
-              <a:buFont typeface="Arial" panose="020B0604020202020204" pitchFamily="34" charset="0"/>
-              <a:buChar char="•"/>
-              <a:defRPr sz="1800" kern="1200">
-                <a:solidFill>
-                  <a:schemeClr val="tx1"/>
-                </a:solidFill>
-                <a:latin typeface="+mn-lt"/>
-                <a:ea typeface="+mn-ea"/>
-                <a:cs typeface="+mn-cs"/>
-              </a:defRPr>
-            </a:lvl5pPr>
-            <a:lvl6pPr marL="2514600" indent="-228600" algn="l" defTabSz="914400" rtl="0" eaLnBrk="1" latinLnBrk="0" hangingPunct="1">
-              <a:lnSpc>
-                <a:spcPct val="90000"/>
-              </a:lnSpc>
-              <a:spcBef>
-                <a:spcPts val="500"/>
-              </a:spcBef>
-              <a:buFont typeface="Arial" panose="020B0604020202020204" pitchFamily="34" charset="0"/>
-              <a:buChar char="•"/>
-              <a:defRPr sz="1800" kern="1200">
-                <a:solidFill>
-                  <a:schemeClr val="tx1"/>
-                </a:solidFill>
-                <a:latin typeface="+mn-lt"/>
-                <a:ea typeface="+mn-ea"/>
-                <a:cs typeface="+mn-cs"/>
-              </a:defRPr>
-            </a:lvl6pPr>
-            <a:lvl7pPr marL="2971800" indent="-228600" algn="l" defTabSz="914400" rtl="0" eaLnBrk="1" latinLnBrk="0" hangingPunct="1">
-              <a:lnSpc>
-                <a:spcPct val="90000"/>
-              </a:lnSpc>
-              <a:spcBef>
-                <a:spcPts val="500"/>
-              </a:spcBef>
-              <a:buFont typeface="Arial" panose="020B0604020202020204" pitchFamily="34" charset="0"/>
-              <a:buChar char="•"/>
-              <a:defRPr sz="1800" kern="1200">
-                <a:solidFill>
-                  <a:schemeClr val="tx1"/>
-                </a:solidFill>
-                <a:latin typeface="+mn-lt"/>
-                <a:ea typeface="+mn-ea"/>
-                <a:cs typeface="+mn-cs"/>
-              </a:defRPr>
-            </a:lvl7pPr>
-            <a:lvl8pPr marL="3429000" indent="-228600" algn="l" defTabSz="914400" rtl="0" eaLnBrk="1" latinLnBrk="0" hangingPunct="1">
-              <a:lnSpc>
-                <a:spcPct val="90000"/>
-              </a:lnSpc>
-              <a:spcBef>
-                <a:spcPts val="500"/>
-              </a:spcBef>
-              <a:buFont typeface="Arial" panose="020B0604020202020204" pitchFamily="34" charset="0"/>
-              <a:buChar char="•"/>
-              <a:defRPr sz="1800" kern="1200">
-                <a:solidFill>
-                  <a:schemeClr val="tx1"/>
-                </a:solidFill>
-                <a:latin typeface="+mn-lt"/>
-                <a:ea typeface="+mn-ea"/>
-                <a:cs typeface="+mn-cs"/>
-              </a:defRPr>
-            </a:lvl8pPr>
-            <a:lvl9pPr marL="3886200" indent="-228600" algn="l" defTabSz="914400" rtl="0" eaLnBrk="1" latinLnBrk="0" hangingPunct="1">
-              <a:lnSpc>
-                <a:spcPct val="90000"/>
-              </a:lnSpc>
-              <a:spcBef>
-                <a:spcPts val="500"/>
-              </a:spcBef>
-              <a:buFont typeface="Arial" panose="020B0604020202020204" pitchFamily="34" charset="0"/>
-              <a:buChar char="•"/>
-              <a:defRPr sz="1800" kern="1200">
-                <a:solidFill>
-                  <a:schemeClr val="tx1"/>
-                </a:solidFill>
-                <a:latin typeface="+mn-lt"/>
-                <a:ea typeface="+mn-ea"/>
-                <a:cs typeface="+mn-cs"/>
-              </a:defRPr>
-            </a:lvl9pPr>
-          </a:lstStyle>
-          <a:p>
-            <a:pPr>
-              <a:buFontTx/>
-              <a:buChar char="-"/>
-            </a:pPr>
-            <a:r>
-              <a:rPr lang="en-US" sz="2000" dirty="0">
-                <a:solidFill>
-                  <a:srgbClr val="1C7DDB"/>
-                </a:solidFill>
-                <a:latin typeface="Abadi"/>
-              </a:rPr>
-              <a:t>List the most popular 20 courses here</a:t>
-            </a:r>
-          </a:p>
-          <a:p>
-            <a:pPr>
-              <a:buFontTx/>
-              <a:buChar char="-"/>
-            </a:pPr>
-            <a:r>
-              <a:rPr lang="en-US" sz="2000" dirty="0">
-                <a:solidFill>
-                  <a:srgbClr val="1C7DDB"/>
-                </a:solidFill>
-                <a:latin typeface="Abadi"/>
-              </a:rPr>
-              <a:t>Briefly explain the course list in the slide notes (for peer-review purpose)</a:t>
-            </a:r>
-            <a:endParaRPr lang="en-US" sz="2000" dirty="0">
-              <a:solidFill>
-                <a:srgbClr val="1C7DDB"/>
-              </a:solidFill>
-              <a:latin typeface="Abadi"/>
-              <a:cs typeface="Calibri"/>
-            </a:endParaRPr>
-          </a:p>
-          <a:p>
-            <a:pPr>
-              <a:buFontTx/>
-              <a:buChar char="-"/>
-            </a:pPr>
-            <a:endParaRPr lang="en-US" sz="2000" dirty="0">
-              <a:solidFill>
-                <a:srgbClr val="1C7DDB"/>
-              </a:solidFill>
-              <a:latin typeface="Abadi"/>
-            </a:endParaRPr>
-          </a:p>
-          <a:p>
-            <a:pPr>
-              <a:buFontTx/>
-              <a:buChar char="-"/>
-            </a:pPr>
-            <a:endParaRPr lang="en-US" sz="2200" dirty="0">
-              <a:solidFill>
-                <a:srgbClr val="1C7DDB"/>
-              </a:solidFill>
-              <a:latin typeface="Abadi"/>
-              <a:cs typeface="Calibri"/>
-            </a:endParaRPr>
-          </a:p>
-        </p:txBody>
-      </p:sp>
       <p:pic>
         <p:nvPicPr>
           <p:cNvPr id="3" name="Picture 2" descr="A picture containing table&#10;&#10;Description automatically generated">
@@ -17228,7 +16728,7 @@
           <p:nvPr/>
         </p:nvPicPr>
         <p:blipFill>
-          <a:blip r:embed="rId2"/>
+          <a:blip r:embed="rId3"/>
           <a:stretch>
             <a:fillRect/>
           </a:stretch>
@@ -17237,6 +16737,36 @@
           <a:xfrm>
             <a:off x="4627345" y="2696546"/>
             <a:ext cx="2590800" cy="3594100"/>
+          </a:xfrm>
+          <a:prstGeom prst="rect">
+            <a:avLst/>
+          </a:prstGeom>
+        </p:spPr>
+      </p:pic>
+      <p:pic>
+        <p:nvPicPr>
+          <p:cNvPr id="5" name="Picture 4">
+            <a:extLst>
+              <a:ext uri="{FF2B5EF4-FFF2-40B4-BE49-F238E27FC236}">
+                <a16:creationId xmlns:a16="http://schemas.microsoft.com/office/drawing/2014/main" id="{5B51831E-728B-5F03-EA6F-3371BF798534}"/>
+              </a:ext>
+            </a:extLst>
+          </p:cNvPr>
+          <p:cNvPicPr>
+            <a:picLocks noChangeAspect="1"/>
+          </p:cNvPicPr>
+          <p:nvPr/>
+        </p:nvPicPr>
+        <p:blipFill>
+          <a:blip r:embed="rId4"/>
+          <a:stretch>
+            <a:fillRect/>
+          </a:stretch>
+        </p:blipFill>
+        <p:spPr>
+          <a:xfrm>
+            <a:off x="3341470" y="1603992"/>
+            <a:ext cx="5162550" cy="4591050"/>
           </a:xfrm>
           <a:prstGeom prst="rect">
             <a:avLst/>
@@ -17306,264 +16836,36 @@
           </a:p>
         </p:txBody>
       </p:sp>
-      <p:sp>
-        <p:nvSpPr>
-          <p:cNvPr id="6" name="Content Placeholder 4">
-            <a:extLst>
-              <a:ext uri="{FF2B5EF4-FFF2-40B4-BE49-F238E27FC236}">
-                <a16:creationId xmlns:a16="http://schemas.microsoft.com/office/drawing/2014/main" id="{A4D1CBA0-D4EF-0E4C-91FB-ACF90D54854A}"/>
-              </a:ext>
-            </a:extLst>
-          </p:cNvPr>
-          <p:cNvSpPr txBox="1">
-            <a:spLocks/>
-          </p:cNvSpPr>
+      <p:pic>
+        <p:nvPicPr>
+          <p:cNvPr id="3" name="Picture 2">
+            <a:extLst>
+              <a:ext uri="{FF2B5EF4-FFF2-40B4-BE49-F238E27FC236}">
+                <a16:creationId xmlns:a16="http://schemas.microsoft.com/office/drawing/2014/main" id="{4157EF5A-F429-687F-D29B-446772C6F189}"/>
+              </a:ext>
+            </a:extLst>
+          </p:cNvPr>
+          <p:cNvPicPr>
+            <a:picLocks noChangeAspect="1"/>
+          </p:cNvPicPr>
           <p:nvPr/>
-        </p:nvSpPr>
+        </p:nvPicPr>
+        <p:blipFill>
+          <a:blip r:embed="rId3"/>
+          <a:stretch>
+            <a:fillRect/>
+          </a:stretch>
+        </p:blipFill>
         <p:spPr>
           <a:xfrm>
-            <a:off x="855663" y="1792289"/>
-            <a:ext cx="10515600" cy="4011746"/>
+            <a:off x="754602" y="968540"/>
+            <a:ext cx="10599198" cy="5363815"/>
           </a:xfrm>
           <a:prstGeom prst="rect">
             <a:avLst/>
           </a:prstGeom>
-          <a:ln>
-            <a:solidFill>
-              <a:srgbClr val="0B49CB"/>
-            </a:solidFill>
-            <a:prstDash val="dash"/>
-          </a:ln>
         </p:spPr>
-        <p:txBody>
-          <a:bodyPr vert="horz" lIns="91440" tIns="45720" rIns="91440" bIns="45720" rtlCol="0" anchor="t">
-            <a:normAutofit/>
-          </a:bodyPr>
-          <a:lstStyle>
-            <a:lvl1pPr marL="228600" indent="-228600" algn="l" defTabSz="914400" rtl="0" eaLnBrk="1" latinLnBrk="0" hangingPunct="1">
-              <a:lnSpc>
-                <a:spcPct val="90000"/>
-              </a:lnSpc>
-              <a:spcBef>
-                <a:spcPts val="1000"/>
-              </a:spcBef>
-              <a:buFont typeface="Arial" panose="020B0604020202020204" pitchFamily="34" charset="0"/>
-              <a:buChar char="•"/>
-              <a:defRPr sz="2800" kern="1200">
-                <a:solidFill>
-                  <a:schemeClr val="tx1"/>
-                </a:solidFill>
-                <a:latin typeface="+mn-lt"/>
-                <a:ea typeface="+mn-ea"/>
-                <a:cs typeface="+mn-cs"/>
-              </a:defRPr>
-            </a:lvl1pPr>
-            <a:lvl2pPr marL="685800" indent="-228600" algn="l" defTabSz="914400" rtl="0" eaLnBrk="1" latinLnBrk="0" hangingPunct="1">
-              <a:lnSpc>
-                <a:spcPct val="90000"/>
-              </a:lnSpc>
-              <a:spcBef>
-                <a:spcPts val="500"/>
-              </a:spcBef>
-              <a:buFont typeface="Arial" panose="020B0604020202020204" pitchFamily="34" charset="0"/>
-              <a:buChar char="•"/>
-              <a:defRPr sz="2400" kern="1200">
-                <a:solidFill>
-                  <a:schemeClr val="tx1"/>
-                </a:solidFill>
-                <a:latin typeface="+mn-lt"/>
-                <a:ea typeface="+mn-ea"/>
-                <a:cs typeface="+mn-cs"/>
-              </a:defRPr>
-            </a:lvl2pPr>
-            <a:lvl3pPr marL="1143000" indent="-228600" algn="l" defTabSz="914400" rtl="0" eaLnBrk="1" latinLnBrk="0" hangingPunct="1">
-              <a:lnSpc>
-                <a:spcPct val="90000"/>
-              </a:lnSpc>
-              <a:spcBef>
-                <a:spcPts val="500"/>
-              </a:spcBef>
-              <a:buFont typeface="Arial" panose="020B0604020202020204" pitchFamily="34" charset="0"/>
-              <a:buChar char="•"/>
-              <a:defRPr sz="2000" kern="1200">
-                <a:solidFill>
-                  <a:schemeClr val="tx1"/>
-                </a:solidFill>
-                <a:latin typeface="+mn-lt"/>
-                <a:ea typeface="+mn-ea"/>
-                <a:cs typeface="+mn-cs"/>
-              </a:defRPr>
-            </a:lvl3pPr>
-            <a:lvl4pPr marL="1600200" indent="-228600" algn="l" defTabSz="914400" rtl="0" eaLnBrk="1" latinLnBrk="0" hangingPunct="1">
-              <a:lnSpc>
-                <a:spcPct val="90000"/>
-              </a:lnSpc>
-              <a:spcBef>
-                <a:spcPts val="500"/>
-              </a:spcBef>
-              <a:buFont typeface="Arial" panose="020B0604020202020204" pitchFamily="34" charset="0"/>
-              <a:buChar char="•"/>
-              <a:defRPr sz="1800" kern="1200">
-                <a:solidFill>
-                  <a:schemeClr val="tx1"/>
-                </a:solidFill>
-                <a:latin typeface="+mn-lt"/>
-                <a:ea typeface="+mn-ea"/>
-                <a:cs typeface="+mn-cs"/>
-              </a:defRPr>
-            </a:lvl4pPr>
-            <a:lvl5pPr marL="2057400" indent="-228600" algn="l" defTabSz="914400" rtl="0" eaLnBrk="1" latinLnBrk="0" hangingPunct="1">
-              <a:lnSpc>
-                <a:spcPct val="90000"/>
-              </a:lnSpc>
-              <a:spcBef>
-                <a:spcPts val="500"/>
-              </a:spcBef>
-              <a:buFont typeface="Arial" panose="020B0604020202020204" pitchFamily="34" charset="0"/>
-              <a:buChar char="•"/>
-              <a:defRPr sz="1800" kern="1200">
-                <a:solidFill>
-                  <a:schemeClr val="tx1"/>
-                </a:solidFill>
-                <a:latin typeface="+mn-lt"/>
-                <a:ea typeface="+mn-ea"/>
-                <a:cs typeface="+mn-cs"/>
-              </a:defRPr>
-            </a:lvl5pPr>
-            <a:lvl6pPr marL="2514600" indent="-228600" algn="l" defTabSz="914400" rtl="0" eaLnBrk="1" latinLnBrk="0" hangingPunct="1">
-              <a:lnSpc>
-                <a:spcPct val="90000"/>
-              </a:lnSpc>
-              <a:spcBef>
-                <a:spcPts val="500"/>
-              </a:spcBef>
-              <a:buFont typeface="Arial" panose="020B0604020202020204" pitchFamily="34" charset="0"/>
-              <a:buChar char="•"/>
-              <a:defRPr sz="1800" kern="1200">
-                <a:solidFill>
-                  <a:schemeClr val="tx1"/>
-                </a:solidFill>
-                <a:latin typeface="+mn-lt"/>
-                <a:ea typeface="+mn-ea"/>
-                <a:cs typeface="+mn-cs"/>
-              </a:defRPr>
-            </a:lvl6pPr>
-            <a:lvl7pPr marL="2971800" indent="-228600" algn="l" defTabSz="914400" rtl="0" eaLnBrk="1" latinLnBrk="0" hangingPunct="1">
-              <a:lnSpc>
-                <a:spcPct val="90000"/>
-              </a:lnSpc>
-              <a:spcBef>
-                <a:spcPts val="500"/>
-              </a:spcBef>
-              <a:buFont typeface="Arial" panose="020B0604020202020204" pitchFamily="34" charset="0"/>
-              <a:buChar char="•"/>
-              <a:defRPr sz="1800" kern="1200">
-                <a:solidFill>
-                  <a:schemeClr val="tx1"/>
-                </a:solidFill>
-                <a:latin typeface="+mn-lt"/>
-                <a:ea typeface="+mn-ea"/>
-                <a:cs typeface="+mn-cs"/>
-              </a:defRPr>
-            </a:lvl7pPr>
-            <a:lvl8pPr marL="3429000" indent="-228600" algn="l" defTabSz="914400" rtl="0" eaLnBrk="1" latinLnBrk="0" hangingPunct="1">
-              <a:lnSpc>
-                <a:spcPct val="90000"/>
-              </a:lnSpc>
-              <a:spcBef>
-                <a:spcPts val="500"/>
-              </a:spcBef>
-              <a:buFont typeface="Arial" panose="020B0604020202020204" pitchFamily="34" charset="0"/>
-              <a:buChar char="•"/>
-              <a:defRPr sz="1800" kern="1200">
-                <a:solidFill>
-                  <a:schemeClr val="tx1"/>
-                </a:solidFill>
-                <a:latin typeface="+mn-lt"/>
-                <a:ea typeface="+mn-ea"/>
-                <a:cs typeface="+mn-cs"/>
-              </a:defRPr>
-            </a:lvl8pPr>
-            <a:lvl9pPr marL="3886200" indent="-228600" algn="l" defTabSz="914400" rtl="0" eaLnBrk="1" latinLnBrk="0" hangingPunct="1">
-              <a:lnSpc>
-                <a:spcPct val="90000"/>
-              </a:lnSpc>
-              <a:spcBef>
-                <a:spcPts val="500"/>
-              </a:spcBef>
-              <a:buFont typeface="Arial" panose="020B0604020202020204" pitchFamily="34" charset="0"/>
-              <a:buChar char="•"/>
-              <a:defRPr sz="1800" kern="1200">
-                <a:solidFill>
-                  <a:schemeClr val="tx1"/>
-                </a:solidFill>
-                <a:latin typeface="+mn-lt"/>
-                <a:ea typeface="+mn-ea"/>
-                <a:cs typeface="+mn-cs"/>
-              </a:defRPr>
-            </a:lvl9pPr>
-          </a:lstStyle>
-          <a:p>
-            <a:pPr marL="0" indent="0">
-              <a:buFont typeface="Arial" panose="020B0604020202020204" pitchFamily="34" charset="0"/>
-              <a:buNone/>
-            </a:pPr>
-            <a:endParaRPr lang="en-US" sz="2200" dirty="0">
-              <a:solidFill>
-                <a:srgbClr val="1C7DDB"/>
-              </a:solidFill>
-              <a:latin typeface="Abadi"/>
-            </a:endParaRPr>
-          </a:p>
-          <a:p>
-            <a:pPr>
-              <a:buFontTx/>
-              <a:buChar char="-"/>
-            </a:pPr>
-            <a:r>
-              <a:rPr lang="en-US" sz="2000" dirty="0">
-                <a:solidFill>
-                  <a:srgbClr val="1C7DDB"/>
-                </a:solidFill>
-                <a:latin typeface="Abadi"/>
-              </a:rPr>
-              <a:t>Place the word cloud (created from course titles) here</a:t>
-            </a:r>
-          </a:p>
-          <a:p>
-            <a:pPr>
-              <a:buFontTx/>
-              <a:buChar char="-"/>
-            </a:pPr>
-            <a:endParaRPr lang="en-US" sz="2000" dirty="0">
-              <a:solidFill>
-                <a:srgbClr val="1C7DDB"/>
-              </a:solidFill>
-              <a:latin typeface="Abadi"/>
-              <a:cs typeface="Calibri"/>
-            </a:endParaRPr>
-          </a:p>
-          <a:p>
-            <a:pPr>
-              <a:buFontTx/>
-              <a:buChar char="-"/>
-            </a:pPr>
-            <a:r>
-              <a:rPr lang="en-US" sz="2000" dirty="0">
-                <a:solidFill>
-                  <a:srgbClr val="1C7DDB"/>
-                </a:solidFill>
-                <a:latin typeface="Abadi"/>
-                <a:cs typeface="Calibri"/>
-              </a:rPr>
-              <a:t>Briefly explain the word cloud in the slide note (for peer-review purpose)</a:t>
-            </a:r>
-            <a:endParaRPr lang="en-US" sz="2400" dirty="0">
-              <a:cs typeface="Calibri"/>
-            </a:endParaRPr>
-          </a:p>
-        </p:txBody>
-      </p:sp>
+      </p:pic>
     </p:spTree>
     <p:extLst>
       <p:ext uri="{BB962C8B-B14F-4D97-AF65-F5344CB8AC3E}">

</xml_diff>